<commit_message>
update MPSA 2025 presentation
</commit_message>
<xml_diff>
--- a/presentation/networks-learningMPSA25.pptx
+++ b/presentation/networks-learningMPSA25.pptx
@@ -139,7 +139,7 @@
 <file path=ppt/revisionInfo.xml><?xml version="1.0" encoding="utf-8"?>
 <p1510:revInfo xmlns:a="http://schemas.openxmlformats.org/drawingml/2006/main" xmlns:r="http://schemas.openxmlformats.org/officeDocument/2006/relationships" xmlns:p1510="http://schemas.microsoft.com/office/powerpoint/2015/10/main">
   <p1510:revLst>
-    <p1510:client id="{F642613A-ACCF-AA41-8BB0-701631FD7E66}" v="2" dt="2025-04-04T15:49:50.866"/>
+    <p1510:client id="{F642613A-ACCF-AA41-8BB0-701631FD7E66}" v="2" dt="2025-04-04T15:56:03.256"/>
   </p1510:revLst>
 </p1510:revInfo>
 </file>
@@ -148,19 +148,19 @@
 <pc:chgInfo xmlns:a="http://schemas.openxmlformats.org/drawingml/2006/main" xmlns:r="http://schemas.openxmlformats.org/officeDocument/2006/relationships" xmlns:ac="http://schemas.microsoft.com/office/drawing/2013/main/command" xmlns:pc="http://schemas.microsoft.com/office/powerpoint/2013/main/command">
   <pc:docChgLst>
     <pc:chgData name="Nowlin, Matt" userId="68025948-0ef4-46c6-95c1-3c7448a61d96" providerId="ADAL" clId="{F642613A-ACCF-AA41-8BB0-701631FD7E66}"/>
-    <pc:docChg chg="undo custSel delSld modSld">
-      <pc:chgData name="Nowlin, Matt" userId="68025948-0ef4-46c6-95c1-3c7448a61d96" providerId="ADAL" clId="{F642613A-ACCF-AA41-8BB0-701631FD7E66}" dt="2025-04-04T15:52:25.782" v="82" actId="1076"/>
+    <pc:docChg chg="custSel delSld modSld">
+      <pc:chgData name="Nowlin, Matt" userId="68025948-0ef4-46c6-95c1-3c7448a61d96" providerId="ADAL" clId="{F642613A-ACCF-AA41-8BB0-701631FD7E66}" dt="2025-04-04T15:56:24.139" v="11" actId="33524"/>
       <pc:docMkLst>
         <pc:docMk/>
       </pc:docMkLst>
       <pc:sldChg chg="modSp mod">
-        <pc:chgData name="Nowlin, Matt" userId="68025948-0ef4-46c6-95c1-3c7448a61d96" providerId="ADAL" clId="{F642613A-ACCF-AA41-8BB0-701631FD7E66}" dt="2025-04-04T15:52:25.782" v="82" actId="1076"/>
+        <pc:chgData name="Nowlin, Matt" userId="68025948-0ef4-46c6-95c1-3c7448a61d96" providerId="ADAL" clId="{F642613A-ACCF-AA41-8BB0-701631FD7E66}" dt="2025-04-04T15:55:49.625" v="5" actId="27636"/>
         <pc:sldMkLst>
           <pc:docMk/>
           <pc:sldMk cId="0" sldId="256"/>
         </pc:sldMkLst>
         <pc:spChg chg="mod">
-          <ac:chgData name="Nowlin, Matt" userId="68025948-0ef4-46c6-95c1-3c7448a61d96" providerId="ADAL" clId="{F642613A-ACCF-AA41-8BB0-701631FD7E66}" dt="2025-04-04T15:49:35.288" v="5" actId="27636"/>
+          <ac:chgData name="Nowlin, Matt" userId="68025948-0ef4-46c6-95c1-3c7448a61d96" providerId="ADAL" clId="{F642613A-ACCF-AA41-8BB0-701631FD7E66}" dt="2025-04-04T15:55:49.624" v="4" actId="27636"/>
           <ac:spMkLst>
             <pc:docMk/>
             <pc:sldMk cId="0" sldId="256"/>
@@ -168,15 +168,7 @@
           </ac:spMkLst>
         </pc:spChg>
         <pc:spChg chg="mod">
-          <ac:chgData name="Nowlin, Matt" userId="68025948-0ef4-46c6-95c1-3c7448a61d96" providerId="ADAL" clId="{F642613A-ACCF-AA41-8BB0-701631FD7E66}" dt="2025-04-04T15:52:25.782" v="82" actId="1076"/>
-          <ac:spMkLst>
-            <pc:docMk/>
-            <pc:sldMk cId="0" sldId="256"/>
-            <ac:spMk id="4" creationId="{5C30F898-8903-BA48-8639-790A081B501B}"/>
-          </ac:spMkLst>
-        </pc:spChg>
-        <pc:spChg chg="mod">
-          <ac:chgData name="Nowlin, Matt" userId="68025948-0ef4-46c6-95c1-3c7448a61d96" providerId="ADAL" clId="{F642613A-ACCF-AA41-8BB0-701631FD7E66}" dt="2025-04-04T15:49:35.289" v="6" actId="27636"/>
+          <ac:chgData name="Nowlin, Matt" userId="68025948-0ef4-46c6-95c1-3c7448a61d96" providerId="ADAL" clId="{F642613A-ACCF-AA41-8BB0-701631FD7E66}" dt="2025-04-04T15:55:49.625" v="5" actId="27636"/>
           <ac:spMkLst>
             <pc:docMk/>
             <pc:sldMk cId="0" sldId="256"/>
@@ -185,13 +177,13 @@
         </pc:spChg>
       </pc:sldChg>
       <pc:sldChg chg="modSp mod">
-        <pc:chgData name="Nowlin, Matt" userId="68025948-0ef4-46c6-95c1-3c7448a61d96" providerId="ADAL" clId="{F642613A-ACCF-AA41-8BB0-701631FD7E66}" dt="2025-04-04T15:48:59.298" v="2" actId="1076"/>
+        <pc:chgData name="Nowlin, Matt" userId="68025948-0ef4-46c6-95c1-3c7448a61d96" providerId="ADAL" clId="{F642613A-ACCF-AA41-8BB0-701631FD7E66}" dt="2025-04-04T15:55:28.163" v="1" actId="1076"/>
         <pc:sldMkLst>
           <pc:docMk/>
           <pc:sldMk cId="0" sldId="260"/>
         </pc:sldMkLst>
         <pc:picChg chg="mod">
-          <ac:chgData name="Nowlin, Matt" userId="68025948-0ef4-46c6-95c1-3c7448a61d96" providerId="ADAL" clId="{F642613A-ACCF-AA41-8BB0-701631FD7E66}" dt="2025-04-04T15:48:59.298" v="2" actId="1076"/>
+          <ac:chgData name="Nowlin, Matt" userId="68025948-0ef4-46c6-95c1-3c7448a61d96" providerId="ADAL" clId="{F642613A-ACCF-AA41-8BB0-701631FD7E66}" dt="2025-04-04T15:55:28.163" v="1" actId="1076"/>
           <ac:picMkLst>
             <pc:docMk/>
             <pc:sldMk cId="0" sldId="260"/>
@@ -200,36 +192,36 @@
         </pc:picChg>
       </pc:sldChg>
       <pc:sldChg chg="addSp modSp mod">
-        <pc:chgData name="Nowlin, Matt" userId="68025948-0ef4-46c6-95c1-3c7448a61d96" providerId="ADAL" clId="{F642613A-ACCF-AA41-8BB0-701631FD7E66}" dt="2025-04-04T15:50:00.167" v="10" actId="1076"/>
+        <pc:chgData name="Nowlin, Matt" userId="68025948-0ef4-46c6-95c1-3c7448a61d96" providerId="ADAL" clId="{F642613A-ACCF-AA41-8BB0-701631FD7E66}" dt="2025-04-04T15:56:09.310" v="9" actId="1076"/>
         <pc:sldMkLst>
           <pc:docMk/>
           <pc:sldMk cId="0" sldId="268"/>
         </pc:sldMkLst>
         <pc:spChg chg="add mod">
-          <ac:chgData name="Nowlin, Matt" userId="68025948-0ef4-46c6-95c1-3c7448a61d96" providerId="ADAL" clId="{F642613A-ACCF-AA41-8BB0-701631FD7E66}" dt="2025-04-04T15:49:42.117" v="7" actId="1076"/>
+          <ac:chgData name="Nowlin, Matt" userId="68025948-0ef4-46c6-95c1-3c7448a61d96" providerId="ADAL" clId="{F642613A-ACCF-AA41-8BB0-701631FD7E66}" dt="2025-04-04T15:55:55.051" v="6" actId="1076"/>
           <ac:spMkLst>
             <pc:docMk/>
             <pc:sldMk cId="0" sldId="268"/>
-            <ac:spMk id="4" creationId="{2D025503-9188-306D-6CB1-C870E127CD18}"/>
+            <ac:spMk id="4" creationId="{1DF4E38A-C9DD-E301-3585-7AC8CC4F5C4D}"/>
           </ac:spMkLst>
         </pc:spChg>
         <pc:spChg chg="add mod">
-          <ac:chgData name="Nowlin, Matt" userId="68025948-0ef4-46c6-95c1-3c7448a61d96" providerId="ADAL" clId="{F642613A-ACCF-AA41-8BB0-701631FD7E66}" dt="2025-04-04T15:50:00.167" v="10" actId="1076"/>
+          <ac:chgData name="Nowlin, Matt" userId="68025948-0ef4-46c6-95c1-3c7448a61d96" providerId="ADAL" clId="{F642613A-ACCF-AA41-8BB0-701631FD7E66}" dt="2025-04-04T15:56:09.310" v="9" actId="1076"/>
           <ac:spMkLst>
             <pc:docMk/>
             <pc:sldMk cId="0" sldId="268"/>
-            <ac:spMk id="5" creationId="{15682D67-BD5C-BBC6-6FD8-4C1EB994CA35}"/>
+            <ac:spMk id="5" creationId="{250ADF5C-FB55-4981-F703-91A7E90531C0}"/>
           </ac:spMkLst>
         </pc:spChg>
       </pc:sldChg>
       <pc:sldChg chg="addSp delSp modSp del mod">
-        <pc:chgData name="Nowlin, Matt" userId="68025948-0ef4-46c6-95c1-3c7448a61d96" providerId="ADAL" clId="{F642613A-ACCF-AA41-8BB0-701631FD7E66}" dt="2025-04-04T15:50:05.588" v="11" actId="2696"/>
+        <pc:chgData name="Nowlin, Matt" userId="68025948-0ef4-46c6-95c1-3c7448a61d96" providerId="ADAL" clId="{F642613A-ACCF-AA41-8BB0-701631FD7E66}" dt="2025-04-04T15:56:13.287" v="10" actId="2696"/>
         <pc:sldMkLst>
           <pc:docMk/>
           <pc:sldMk cId="0" sldId="269"/>
         </pc:sldMkLst>
         <pc:spChg chg="del">
-          <ac:chgData name="Nowlin, Matt" userId="68025948-0ef4-46c6-95c1-3c7448a61d96" providerId="ADAL" clId="{F642613A-ACCF-AA41-8BB0-701631FD7E66}" dt="2025-04-04T15:49:32.229" v="3" actId="21"/>
+          <ac:chgData name="Nowlin, Matt" userId="68025948-0ef4-46c6-95c1-3c7448a61d96" providerId="ADAL" clId="{F642613A-ACCF-AA41-8BB0-701631FD7E66}" dt="2025-04-04T15:55:46.438" v="2" actId="21"/>
           <ac:spMkLst>
             <pc:docMk/>
             <pc:sldMk cId="0" sldId="269"/>
@@ -237,7 +229,7 @@
           </ac:spMkLst>
         </pc:spChg>
         <pc:spChg chg="del">
-          <ac:chgData name="Nowlin, Matt" userId="68025948-0ef4-46c6-95c1-3c7448a61d96" providerId="ADAL" clId="{F642613A-ACCF-AA41-8BB0-701631FD7E66}" dt="2025-04-04T15:49:47.033" v="8" actId="21"/>
+          <ac:chgData name="Nowlin, Matt" userId="68025948-0ef4-46c6-95c1-3c7448a61d96" providerId="ADAL" clId="{F642613A-ACCF-AA41-8BB0-701631FD7E66}" dt="2025-04-04T15:56:00.334" v="7" actId="21"/>
           <ac:spMkLst>
             <pc:docMk/>
             <pc:sldMk cId="0" sldId="269"/>
@@ -245,19 +237,34 @@
           </ac:spMkLst>
         </pc:spChg>
         <pc:spChg chg="add mod">
-          <ac:chgData name="Nowlin, Matt" userId="68025948-0ef4-46c6-95c1-3c7448a61d96" providerId="ADAL" clId="{F642613A-ACCF-AA41-8BB0-701631FD7E66}" dt="2025-04-04T15:49:32.229" v="3" actId="21"/>
+          <ac:chgData name="Nowlin, Matt" userId="68025948-0ef4-46c6-95c1-3c7448a61d96" providerId="ADAL" clId="{F642613A-ACCF-AA41-8BB0-701631FD7E66}" dt="2025-04-04T15:55:46.438" v="2" actId="21"/>
           <ac:spMkLst>
             <pc:docMk/>
             <pc:sldMk cId="0" sldId="269"/>
-            <ac:spMk id="5" creationId="{8838C2AC-4557-2A69-AC0D-6AA29F16A633}"/>
+            <ac:spMk id="5" creationId="{304991D9-6974-3B3C-7FD8-49FA48AF774D}"/>
           </ac:spMkLst>
         </pc:spChg>
         <pc:spChg chg="add mod">
-          <ac:chgData name="Nowlin, Matt" userId="68025948-0ef4-46c6-95c1-3c7448a61d96" providerId="ADAL" clId="{F642613A-ACCF-AA41-8BB0-701631FD7E66}" dt="2025-04-04T15:49:47.033" v="8" actId="21"/>
+          <ac:chgData name="Nowlin, Matt" userId="68025948-0ef4-46c6-95c1-3c7448a61d96" providerId="ADAL" clId="{F642613A-ACCF-AA41-8BB0-701631FD7E66}" dt="2025-04-04T15:56:00.334" v="7" actId="21"/>
           <ac:spMkLst>
             <pc:docMk/>
             <pc:sldMk cId="0" sldId="269"/>
-            <ac:spMk id="7" creationId="{707528EC-D4F4-8290-A98C-C4C617787686}"/>
+            <ac:spMk id="7" creationId="{566D0E56-E2CB-189D-66E2-AC32F1252819}"/>
+          </ac:spMkLst>
+        </pc:spChg>
+      </pc:sldChg>
+      <pc:sldChg chg="modSp mod">
+        <pc:chgData name="Nowlin, Matt" userId="68025948-0ef4-46c6-95c1-3c7448a61d96" providerId="ADAL" clId="{F642613A-ACCF-AA41-8BB0-701631FD7E66}" dt="2025-04-04T15:56:24.139" v="11" actId="33524"/>
+        <pc:sldMkLst>
+          <pc:docMk/>
+          <pc:sldMk cId="0" sldId="271"/>
+        </pc:sldMkLst>
+        <pc:spChg chg="mod">
+          <ac:chgData name="Nowlin, Matt" userId="68025948-0ef4-46c6-95c1-3c7448a61d96" providerId="ADAL" clId="{F642613A-ACCF-AA41-8BB0-701631FD7E66}" dt="2025-04-04T15:56:24.139" v="11" actId="33524"/>
+          <ac:spMkLst>
+            <pc:docMk/>
+            <pc:sldMk cId="0" sldId="271"/>
+            <ac:spMk id="3" creationId="{61B435E7-D930-D442-BF54-20ED18DE6A98}"/>
           </ac:spMkLst>
         </pc:spChg>
       </pc:sldChg>
@@ -662,42 +669,6 @@
             <a:pPr lvl="0"/>
             <a:r>
               <a:t>IV: one type of belief -&gt; DV: another type of belief</a:t>
-            </a:r>
-          </a:p>
-          <a:p>
-            <a:pPr marL="0" lvl="0" indent="0">
-              <a:buNone/>
-            </a:pPr>
-            <a:endParaRPr/>
-          </a:p>
-          <a:p>
-            <a:pPr lvl="0"/>
-            <a:r>
-              <a:t>“Fuzzy” boundaries (e.g., deep vs policy core)</a:t>
-            </a:r>
-          </a:p>
-          <a:p>
-            <a:pPr marL="0" lvl="0" indent="0">
-              <a:buNone/>
-            </a:pPr>
-            <a:endParaRPr/>
-          </a:p>
-          <a:p>
-            <a:pPr lvl="0"/>
-            <a:r>
-              <a:t>Instrument constituencies and deep core belief coalitions</a:t>
-            </a:r>
-          </a:p>
-          <a:p>
-            <a:pPr marL="0" lvl="0" indent="0">
-              <a:buNone/>
-            </a:pPr>
-            <a:endParaRPr/>
-          </a:p>
-          <a:p>
-            <a:pPr lvl="0"/>
-            <a:r>
-              <a:t>Inconsistent findings</a:t>
             </a:r>
           </a:p>
         </p:txBody>
@@ -4318,7 +4289,6 @@
               <a:buNone/>
             </a:pPr>
             <a:r>
-              <a:rPr dirty="0"/>
               <a:t>Belief System Networks and Policy Learning</a:t>
             </a:r>
           </a:p>
@@ -4355,28 +4325,17 @@
             <a:pPr marL="0" lvl="0" indent="0">
               <a:buNone/>
             </a:pPr>
-            <a:br>
-              <a:rPr dirty="0"/>
-            </a:br>
-            <a:br>
-              <a:rPr dirty="0"/>
-            </a:br>
-            <a:r>
-              <a:rPr dirty="0"/>
+            <a:br/>
+            <a:br/>
+            <a:r>
               <a:t>Matthew C. Nowlin, College of Charleston</a:t>
             </a:r>
-            <a:br>
-              <a:rPr dirty="0"/>
-            </a:br>
-            <a:r>
-              <a:rPr dirty="0"/>
+            <a:br/>
+            <a:r>
               <a:t>Kuhika Gupta, University of Oklahoma</a:t>
             </a:r>
-            <a:br>
-              <a:rPr dirty="0"/>
-            </a:br>
-            <a:r>
-              <a:rPr dirty="0"/>
+            <a:br/>
+            <a:r>
               <a:t>Hank Jenkins-Smith, University of Oklahoma</a:t>
             </a:r>
           </a:p>
@@ -4398,12 +4357,7 @@
             <p:ph type="dt" sz="half" idx="10"/>
           </p:nvPr>
         </p:nvSpPr>
-        <p:spPr>
-          <a:xfrm>
-            <a:off x="1524000" y="5277020"/>
-            <a:ext cx="4303644" cy="365125"/>
-          </a:xfrm>
-        </p:spPr>
+        <p:spPr/>
         <p:txBody>
           <a:bodyPr/>
           <a:lstStyle/>
@@ -4412,14 +4366,8 @@
               <a:buNone/>
             </a:pPr>
             <a:r>
-              <a:rPr lang="en-US" sz="1400" dirty="0">
-                <a:latin typeface="AvenirNext LT Pro Regular" panose="020B0504020202020204" pitchFamily="34" charset="77"/>
-              </a:rPr>
-              <a:t>Midwest Political Science Association, April 2025 </a:t>
-            </a:r>
-            <a:endParaRPr sz="1400" dirty="0">
-              <a:latin typeface="AvenirNext LT Pro Regular" panose="020B0504020202020204" pitchFamily="34" charset="77"/>
-            </a:endParaRPr>
+              <a:t>2025-04-01</a:t>
+            </a:r>
           </a:p>
         </p:txBody>
       </p:sp>
@@ -4878,7 +4826,7 @@
           <p:cNvPr id="4" name="Content Placeholder 2">
             <a:extLst>
               <a:ext uri="{FF2B5EF4-FFF2-40B4-BE49-F238E27FC236}">
-                <a16:creationId xmlns:a16="http://schemas.microsoft.com/office/drawing/2014/main" id="{2D025503-9188-306D-6CB1-C870E127CD18}"/>
+                <a16:creationId xmlns:a16="http://schemas.microsoft.com/office/drawing/2014/main" id="{1DF4E38A-C9DD-E301-3585-7AC8CC4F5C4D}"/>
               </a:ext>
             </a:extLst>
           </p:cNvPr>
@@ -4889,7 +4837,7 @@
         </p:nvSpPr>
         <p:spPr>
           <a:xfrm>
-            <a:off x="838200" y="2355712"/>
+            <a:off x="838200" y="2348140"/>
             <a:ext cx="5181600" cy="4351338"/>
           </a:xfrm>
           <a:prstGeom prst="rect">
@@ -5106,7 +5054,7 @@
           <p:cNvPr id="5" name="Content Placeholder 3">
             <a:extLst>
               <a:ext uri="{FF2B5EF4-FFF2-40B4-BE49-F238E27FC236}">
-                <a16:creationId xmlns:a16="http://schemas.microsoft.com/office/drawing/2014/main" id="{15682D67-BD5C-BBC6-6FD8-4C1EB994CA35}"/>
+                <a16:creationId xmlns:a16="http://schemas.microsoft.com/office/drawing/2014/main" id="{250ADF5C-FB55-4981-F703-91A7E90531C0}"/>
               </a:ext>
             </a:extLst>
           </p:cNvPr>
@@ -5117,7 +5065,7 @@
         </p:nvSpPr>
         <p:spPr>
           <a:xfrm>
-            <a:off x="6172200" y="2355712"/>
+            <a:off x="6172200" y="2348140"/>
             <a:ext cx="5181600" cy="4351338"/>
           </a:xfrm>
           <a:prstGeom prst="rect">
@@ -5503,34 +5451,47 @@
           <a:p>
             <a:pPr lvl="0"/>
             <a:r>
-              <a:t>Beliefs are the nodes and the edges are </a:t>
-            </a:r>
-            <a:r>
-              <a:rPr i="1"/>
+              <a:rPr dirty="0"/>
+              <a:t>Beliefs are the </a:t>
+            </a:r>
+            <a:r>
+              <a:rPr lang="en-US" dirty="0"/>
+              <a:t>nodes,</a:t>
+            </a:r>
+            <a:r>
+              <a:rPr dirty="0"/>
+              <a:t> and the edges are </a:t>
+            </a:r>
+            <a:r>
+              <a:rPr i="1" dirty="0"/>
               <a:t>partial correlation coefficients</a:t>
             </a:r>
           </a:p>
           <a:p>
             <a:pPr lvl="0"/>
             <a:r>
+              <a:rPr dirty="0"/>
               <a:t>Weighted by the strength of the partial correlations</a:t>
             </a:r>
           </a:p>
           <a:p>
             <a:pPr lvl="0"/>
             <a:r>
+              <a:rPr dirty="0"/>
               <a:t>Regularized using “least absolute shrinkage and selection operator” (LASSO)</a:t>
             </a:r>
           </a:p>
           <a:p>
             <a:pPr lvl="0"/>
             <a:r>
+              <a:rPr dirty="0"/>
               <a:t>Bootstrapping procedure to estimate centrality measures</a:t>
             </a:r>
           </a:p>
           <a:p>
             <a:pPr lvl="0"/>
             <a:r>
+              <a:rPr dirty="0"/>
               <a:t>Network Comparison Test</a:t>
             </a:r>
           </a:p>
@@ -7228,6 +7189,30 @@
               <a:t> of belief</a:t>
             </a:r>
           </a:p>
+          <a:p>
+            <a:pPr lvl="0"/>
+            <a:r>
+              <a:t>Issues</a:t>
+            </a:r>
+          </a:p>
+          <a:p>
+            <a:pPr lvl="1"/>
+            <a:r>
+              <a:t>“Fuzzy” boundaries (e.g., deep vs policy core)</a:t>
+            </a:r>
+          </a:p>
+          <a:p>
+            <a:pPr lvl="1"/>
+            <a:r>
+              <a:t>Instrument constituencies and deep core belief coalitions</a:t>
+            </a:r>
+          </a:p>
+          <a:p>
+            <a:pPr lvl="1"/>
+            <a:r>
+              <a:t>Inconsistent findings</a:t>
+            </a:r>
+          </a:p>
         </p:txBody>
       </p:sp>
     </p:spTree>
@@ -7407,8 +7392,8 @@
         </p:blipFill>
         <p:spPr bwMode="auto">
           <a:xfrm>
-            <a:off x="882482" y="1690688"/>
-            <a:ext cx="10427036" cy="4343400"/>
+            <a:off x="1162050" y="1795009"/>
+            <a:ext cx="9867900" cy="4110491"/>
           </a:xfrm>
           <a:prstGeom prst="rect">
             <a:avLst/>

</xml_diff>